<commit_message>
Update NEN3610-LD and ISO19103.pptx
</commit_message>
<xml_diff>
--- a/Presentations/NEN3610-LD and ISO19103.pptx
+++ b/Presentations/NEN3610-LD and ISO19103.pptx
@@ -166,6 +166,35 @@
 </p:presentation>
 </file>
 
+<file path=ppt/changesInfos/changesInfo1.xml><?xml version="1.0" encoding="utf-8"?>
+<pc:chgInfo xmlns:a="http://schemas.openxmlformats.org/drawingml/2006/main" xmlns:r="http://schemas.openxmlformats.org/officeDocument/2006/relationships" xmlns:ac="http://schemas.microsoft.com/office/drawing/2013/main/command" xmlns:pc="http://schemas.microsoft.com/office/powerpoint/2013/main/command">
+  <pc:docChgLst>
+    <pc:chgData name="Paul Janssen" userId="b62697e8-e7f0-48fe-b701-a5c7b17d8ebc" providerId="ADAL" clId="{0D9500A9-E53C-48E3-A6B1-FD84F3AF1452}"/>
+    <pc:docChg chg="modSld">
+      <pc:chgData name="Paul Janssen" userId="b62697e8-e7f0-48fe-b701-a5c7b17d8ebc" providerId="ADAL" clId="{0D9500A9-E53C-48E3-A6B1-FD84F3AF1452}" dt="2022-11-08T10:45:44.028" v="1" actId="1076"/>
+      <pc:docMkLst>
+        <pc:docMk/>
+      </pc:docMkLst>
+      <pc:sldChg chg="modSp mod">
+        <pc:chgData name="Paul Janssen" userId="b62697e8-e7f0-48fe-b701-a5c7b17d8ebc" providerId="ADAL" clId="{0D9500A9-E53C-48E3-A6B1-FD84F3AF1452}" dt="2022-11-08T10:45:44.028" v="1" actId="1076"/>
+        <pc:sldMkLst>
+          <pc:docMk/>
+          <pc:sldMk cId="1668571306" sldId="282"/>
+        </pc:sldMkLst>
+        <pc:picChg chg="mod">
+          <ac:chgData name="Paul Janssen" userId="b62697e8-e7f0-48fe-b701-a5c7b17d8ebc" providerId="ADAL" clId="{0D9500A9-E53C-48E3-A6B1-FD84F3AF1452}" dt="2022-11-08T10:45:44.028" v="1" actId="1076"/>
+          <ac:picMkLst>
+            <pc:docMk/>
+            <pc:sldMk cId="1668571306" sldId="282"/>
+            <ac:picMk id="10" creationId="{31647FCF-FE26-4B41-8D87-05C3B5B12560}"/>
+          </ac:picMkLst>
+        </pc:picChg>
+      </pc:sldChg>
+    </pc:docChg>
+  </pc:docChgLst>
+</pc:chgInfo>
+</file>
+
 <file path=ppt/handoutMasters/handoutMaster1.xml><?xml version="1.0" encoding="utf-8"?>
 <p:handoutMaster xmlns:a="http://schemas.openxmlformats.org/drawingml/2006/main" xmlns:r="http://schemas.openxmlformats.org/officeDocument/2006/relationships" xmlns:p="http://schemas.openxmlformats.org/presentationml/2006/main">
   <p:cSld>
@@ -248,7 +277,7 @@
           <a:p>
             <a:fld id="{8F0A3BA6-D212-4021-9C58-E1A860230F97}" type="datetimeFigureOut">
               <a:rPr lang="nl-NL" smtClean="0"/>
-              <a:t>24-11-21</a:t>
+              <a:t>8-11-2022</a:t>
             </a:fld>
             <a:endParaRPr lang="nl-NL"/>
           </a:p>
@@ -414,7 +443,7 @@
           <a:p>
             <a:fld id="{9DDF62C1-85BA-45F7-BA8A-ECE90345B80D}" type="datetimeFigureOut">
               <a:rPr lang="nl-NL" smtClean="0"/>
-              <a:t>24-11-21</a:t>
+              <a:t>8-11-2022</a:t>
             </a:fld>
             <a:endParaRPr lang="nl-NL"/>
           </a:p>
@@ -2336,7 +2365,7 @@
           <a:p>
             <a:fld id="{4697C22A-1C99-4004-8458-4C2A2FAB4D26}" type="datetimeFigureOut">
               <a:rPr lang="nl-NL" smtClean="0"/>
-              <a:t>24-11-21</a:t>
+              <a:t>8-11-2022</a:t>
             </a:fld>
             <a:endParaRPr lang="nl-NL"/>
           </a:p>
@@ -39699,7 +39728,7 @@
         </p:blipFill>
         <p:spPr>
           <a:xfrm>
-            <a:off x="0" y="732318"/>
+            <a:off x="539552" y="758269"/>
             <a:ext cx="9143998" cy="4417527"/>
           </a:xfrm>
           <a:prstGeom prst="rect">

</xml_diff>